<commit_message>
add graph draw of prolog answer
</commit_message>
<xml_diff>
--- a/Relazione.pptx
+++ b/Relazione.pptx
@@ -6,6 +6,7 @@
   </p:sldMasterIdLst>
   <p:sldIdLst>
     <p:sldId id="256" r:id="rId2"/>
+    <p:sldId id="257" r:id="rId3"/>
   </p:sldIdLst>
   <p:sldSz cx="9144000" cy="6858000" type="screen4x3"/>
   <p:notesSz cx="6858000" cy="9144000"/>
@@ -289,7 +290,7 @@
             <a:fld id="{4B6055F8-1D02-4417-9241-55C834FD9970}" type="datetimeFigureOut">
               <a:rPr lang="it-IT" smtClean="0"/>
               <a:pPr/>
-              <a:t>23/10/2019</a:t>
+              <a:t>04/11/2019</a:t>
             </a:fld>
             <a:endParaRPr lang="it-IT"/>
           </a:p>
@@ -332,7 +333,7 @@
             <a:fld id="{B007B441-5312-499D-93C3-6E37886527FA}" type="slidenum">
               <a:rPr lang="it-IT" smtClean="0"/>
               <a:pPr/>
-              <a:t>‹N›</a:t>
+              <a:t>‹#›</a:t>
             </a:fld>
             <a:endParaRPr lang="it-IT"/>
           </a:p>
@@ -456,7 +457,7 @@
             <a:fld id="{4B6055F8-1D02-4417-9241-55C834FD9970}" type="datetimeFigureOut">
               <a:rPr lang="it-IT" smtClean="0"/>
               <a:pPr/>
-              <a:t>23/10/2019</a:t>
+              <a:t>04/11/2019</a:t>
             </a:fld>
             <a:endParaRPr lang="it-IT"/>
           </a:p>
@@ -499,7 +500,7 @@
             <a:fld id="{B007B441-5312-499D-93C3-6E37886527FA}" type="slidenum">
               <a:rPr lang="it-IT" smtClean="0"/>
               <a:pPr/>
-              <a:t>‹N›</a:t>
+              <a:t>‹#›</a:t>
             </a:fld>
             <a:endParaRPr lang="it-IT"/>
           </a:p>
@@ -633,7 +634,7 @@
             <a:fld id="{4B6055F8-1D02-4417-9241-55C834FD9970}" type="datetimeFigureOut">
               <a:rPr lang="it-IT" smtClean="0"/>
               <a:pPr/>
-              <a:t>23/10/2019</a:t>
+              <a:t>04/11/2019</a:t>
             </a:fld>
             <a:endParaRPr lang="it-IT"/>
           </a:p>
@@ -676,7 +677,7 @@
             <a:fld id="{B007B441-5312-499D-93C3-6E37886527FA}" type="slidenum">
               <a:rPr lang="it-IT" smtClean="0"/>
               <a:pPr/>
-              <a:t>‹N›</a:t>
+              <a:t>‹#›</a:t>
             </a:fld>
             <a:endParaRPr lang="it-IT"/>
           </a:p>
@@ -800,7 +801,7 @@
             <a:fld id="{4B6055F8-1D02-4417-9241-55C834FD9970}" type="datetimeFigureOut">
               <a:rPr lang="it-IT" smtClean="0"/>
               <a:pPr/>
-              <a:t>23/10/2019</a:t>
+              <a:t>04/11/2019</a:t>
             </a:fld>
             <a:endParaRPr lang="it-IT"/>
           </a:p>
@@ -843,7 +844,7 @@
             <a:fld id="{B007B441-5312-499D-93C3-6E37886527FA}" type="slidenum">
               <a:rPr lang="it-IT" smtClean="0"/>
               <a:pPr/>
-              <a:t>‹N›</a:t>
+              <a:t>‹#›</a:t>
             </a:fld>
             <a:endParaRPr lang="it-IT"/>
           </a:p>
@@ -1043,7 +1044,7 @@
             <a:fld id="{4B6055F8-1D02-4417-9241-55C834FD9970}" type="datetimeFigureOut">
               <a:rPr lang="it-IT" smtClean="0"/>
               <a:pPr/>
-              <a:t>23/10/2019</a:t>
+              <a:t>04/11/2019</a:t>
             </a:fld>
             <a:endParaRPr lang="it-IT"/>
           </a:p>
@@ -1086,7 +1087,7 @@
             <a:fld id="{B007B441-5312-499D-93C3-6E37886527FA}" type="slidenum">
               <a:rPr lang="it-IT" smtClean="0"/>
               <a:pPr/>
-              <a:t>‹N›</a:t>
+              <a:t>‹#›</a:t>
             </a:fld>
             <a:endParaRPr lang="it-IT"/>
           </a:p>
@@ -1328,7 +1329,7 @@
             <a:fld id="{4B6055F8-1D02-4417-9241-55C834FD9970}" type="datetimeFigureOut">
               <a:rPr lang="it-IT" smtClean="0"/>
               <a:pPr/>
-              <a:t>23/10/2019</a:t>
+              <a:t>04/11/2019</a:t>
             </a:fld>
             <a:endParaRPr lang="it-IT"/>
           </a:p>
@@ -1371,7 +1372,7 @@
             <a:fld id="{B007B441-5312-499D-93C3-6E37886527FA}" type="slidenum">
               <a:rPr lang="it-IT" smtClean="0"/>
               <a:pPr/>
-              <a:t>‹N›</a:t>
+              <a:t>‹#›</a:t>
             </a:fld>
             <a:endParaRPr lang="it-IT"/>
           </a:p>
@@ -1747,7 +1748,7 @@
             <a:fld id="{4B6055F8-1D02-4417-9241-55C834FD9970}" type="datetimeFigureOut">
               <a:rPr lang="it-IT" smtClean="0"/>
               <a:pPr/>
-              <a:t>23/10/2019</a:t>
+              <a:t>04/11/2019</a:t>
             </a:fld>
             <a:endParaRPr lang="it-IT"/>
           </a:p>
@@ -1790,7 +1791,7 @@
             <a:fld id="{B007B441-5312-499D-93C3-6E37886527FA}" type="slidenum">
               <a:rPr lang="it-IT" smtClean="0"/>
               <a:pPr/>
-              <a:t>‹N›</a:t>
+              <a:t>‹#›</a:t>
             </a:fld>
             <a:endParaRPr lang="it-IT"/>
           </a:p>
@@ -1862,7 +1863,7 @@
             <a:fld id="{4B6055F8-1D02-4417-9241-55C834FD9970}" type="datetimeFigureOut">
               <a:rPr lang="it-IT" smtClean="0"/>
               <a:pPr/>
-              <a:t>23/10/2019</a:t>
+              <a:t>04/11/2019</a:t>
             </a:fld>
             <a:endParaRPr lang="it-IT"/>
           </a:p>
@@ -1905,7 +1906,7 @@
             <a:fld id="{B007B441-5312-499D-93C3-6E37886527FA}" type="slidenum">
               <a:rPr lang="it-IT" smtClean="0"/>
               <a:pPr/>
-              <a:t>‹N›</a:t>
+              <a:t>‹#›</a:t>
             </a:fld>
             <a:endParaRPr lang="it-IT"/>
           </a:p>
@@ -1954,7 +1955,7 @@
             <a:fld id="{4B6055F8-1D02-4417-9241-55C834FD9970}" type="datetimeFigureOut">
               <a:rPr lang="it-IT" smtClean="0"/>
               <a:pPr/>
-              <a:t>23/10/2019</a:t>
+              <a:t>04/11/2019</a:t>
             </a:fld>
             <a:endParaRPr lang="it-IT"/>
           </a:p>
@@ -1997,7 +1998,7 @@
             <a:fld id="{B007B441-5312-499D-93C3-6E37886527FA}" type="slidenum">
               <a:rPr lang="it-IT" smtClean="0"/>
               <a:pPr/>
-              <a:t>‹N›</a:t>
+              <a:t>‹#›</a:t>
             </a:fld>
             <a:endParaRPr lang="it-IT"/>
           </a:p>
@@ -2228,7 +2229,7 @@
             <a:fld id="{4B6055F8-1D02-4417-9241-55C834FD9970}" type="datetimeFigureOut">
               <a:rPr lang="it-IT" smtClean="0"/>
               <a:pPr/>
-              <a:t>23/10/2019</a:t>
+              <a:t>04/11/2019</a:t>
             </a:fld>
             <a:endParaRPr lang="it-IT"/>
           </a:p>
@@ -2271,7 +2272,7 @@
             <a:fld id="{B007B441-5312-499D-93C3-6E37886527FA}" type="slidenum">
               <a:rPr lang="it-IT" smtClean="0"/>
               <a:pPr/>
-              <a:t>‹N›</a:t>
+              <a:t>‹#›</a:t>
             </a:fld>
             <a:endParaRPr lang="it-IT"/>
           </a:p>
@@ -2478,7 +2479,7 @@
             <a:fld id="{4B6055F8-1D02-4417-9241-55C834FD9970}" type="datetimeFigureOut">
               <a:rPr lang="it-IT" smtClean="0"/>
               <a:pPr/>
-              <a:t>23/10/2019</a:t>
+              <a:t>04/11/2019</a:t>
             </a:fld>
             <a:endParaRPr lang="it-IT"/>
           </a:p>
@@ -2521,7 +2522,7 @@
             <a:fld id="{B007B441-5312-499D-93C3-6E37886527FA}" type="slidenum">
               <a:rPr lang="it-IT" smtClean="0"/>
               <a:pPr/>
-              <a:t>‹N›</a:t>
+              <a:t>‹#›</a:t>
             </a:fld>
             <a:endParaRPr lang="it-IT"/>
           </a:p>
@@ -2688,7 +2689,7 @@
             <a:fld id="{4B6055F8-1D02-4417-9241-55C834FD9970}" type="datetimeFigureOut">
               <a:rPr lang="it-IT" smtClean="0"/>
               <a:pPr/>
-              <a:t>23/10/2019</a:t>
+              <a:t>04/11/2019</a:t>
             </a:fld>
             <a:endParaRPr lang="it-IT"/>
           </a:p>
@@ -2767,7 +2768,7 @@
             <a:fld id="{B007B441-5312-499D-93C3-6E37886527FA}" type="slidenum">
               <a:rPr lang="it-IT" smtClean="0"/>
               <a:pPr/>
-              <a:t>‹N›</a:t>
+              <a:t>‹#›</a:t>
             </a:fld>
             <a:endParaRPr lang="it-IT"/>
           </a:p>
@@ -3067,8 +3068,8 @@
         </p:nvSpPr>
         <p:spPr>
           <a:xfrm>
-            <a:off x="1331640" y="1425550"/>
-            <a:ext cx="6048672" cy="3970318"/>
+            <a:off x="1331640" y="476672"/>
+            <a:ext cx="6048672" cy="5909310"/>
           </a:xfrm>
           <a:prstGeom prst="rect">
             <a:avLst/>
@@ -3208,13 +3209,8 @@
             </a:r>
             <a:r>
               <a:rPr lang="it-IT" dirty="0" smtClean="0"/>
-              <a:t> </a:t>
-            </a:r>
-            <a:r>
-              <a:rPr lang="it-IT" dirty="0" smtClean="0"/>
-              <a:t>Files\swipl\bin)</a:t>
-            </a:r>
-            <a:endParaRPr lang="it-IT" dirty="0" smtClean="0"/>
+              <a:t> Files\swipl\bin)</a:t>
+            </a:r>
           </a:p>
           <a:p>
             <a:pPr lvl="2">
@@ -3239,9 +3235,12 @@
             </a:r>
             <a:r>
               <a:rPr lang="en-US" dirty="0" smtClean="0"/>
-              <a:t> install --global --production windows-build-tools</a:t>
-            </a:r>
-            <a:endParaRPr lang="it-IT" dirty="0" smtClean="0"/>
+              <a:t> install --global --production </a:t>
+            </a:r>
+            <a:r>
+              <a:rPr lang="en-US" dirty="0" smtClean="0"/>
+              <a:t>windows-build-tools</a:t>
+            </a:r>
           </a:p>
           <a:p>
             <a:pPr lvl="1">
@@ -3249,7 +3248,7 @@
               <a:buChar char="•"/>
             </a:pPr>
             <a:r>
-              <a:rPr lang="it-IT" dirty="0" smtClean="0"/>
+              <a:rPr lang="en-US" dirty="0" smtClean="0"/>
               <a:t>Sprint2</a:t>
             </a:r>
           </a:p>
@@ -3259,22 +3258,125 @@
               <a:buChar char="•"/>
             </a:pPr>
             <a:r>
-              <a:rPr lang="it-IT" dirty="0" smtClean="0"/>
-              <a:t>Implementare un modulo per la comunicazione ad un </a:t>
-            </a:r>
-            <a:r>
-              <a:rPr lang="it-IT" dirty="0" err="1" smtClean="0"/>
-              <a:t>MongoDB</a:t>
-            </a:r>
-            <a:r>
-              <a:rPr lang="it-IT" dirty="0" smtClean="0"/>
-              <a:t> tramite </a:t>
-            </a:r>
-            <a:r>
-              <a:rPr lang="it-IT" dirty="0" err="1" smtClean="0"/>
-              <a:t>Prolog</a:t>
-            </a:r>
-            <a:endParaRPr lang="it-IT" dirty="0" smtClean="0"/>
+              <a:rPr lang="en-US" dirty="0" err="1" smtClean="0"/>
+              <a:t>Generare</a:t>
+            </a:r>
+            <a:r>
+              <a:rPr lang="en-US" dirty="0" smtClean="0"/>
+              <a:t> un </a:t>
+            </a:r>
+            <a:r>
+              <a:rPr lang="en-US" dirty="0" err="1" smtClean="0"/>
+              <a:t>motore</a:t>
+            </a:r>
+            <a:r>
+              <a:rPr lang="en-US" dirty="0" smtClean="0"/>
+              <a:t> prolog </a:t>
+            </a:r>
+            <a:r>
+              <a:rPr lang="en-US" dirty="0" err="1" smtClean="0"/>
+              <a:t>capace</a:t>
+            </a:r>
+            <a:r>
+              <a:rPr lang="en-US" dirty="0" smtClean="0"/>
+              <a:t> </a:t>
+            </a:r>
+            <a:r>
+              <a:rPr lang="en-US" dirty="0" err="1" smtClean="0"/>
+              <a:t>di</a:t>
+            </a:r>
+            <a:r>
+              <a:rPr lang="en-US" dirty="0" smtClean="0"/>
+              <a:t> </a:t>
+            </a:r>
+            <a:r>
+              <a:rPr lang="en-US" dirty="0" err="1" smtClean="0"/>
+              <a:t>gestire</a:t>
+            </a:r>
+            <a:r>
+              <a:rPr lang="en-US" dirty="0" smtClean="0"/>
+              <a:t> </a:t>
+            </a:r>
+            <a:r>
+              <a:rPr lang="en-US" dirty="0" err="1" smtClean="0"/>
+              <a:t>una</a:t>
+            </a:r>
+            <a:r>
+              <a:rPr lang="en-US" dirty="0" smtClean="0"/>
+              <a:t> </a:t>
+            </a:r>
+            <a:r>
+              <a:rPr lang="en-US" dirty="0" err="1" smtClean="0"/>
+              <a:t>sequenza</a:t>
+            </a:r>
+            <a:r>
+              <a:rPr lang="en-US" dirty="0" smtClean="0"/>
+              <a:t> </a:t>
+            </a:r>
+            <a:r>
+              <a:rPr lang="en-US" dirty="0" err="1" smtClean="0"/>
+              <a:t>di</a:t>
+            </a:r>
+            <a:r>
+              <a:rPr lang="en-US" dirty="0" smtClean="0"/>
+              <a:t> </a:t>
+            </a:r>
+            <a:r>
+              <a:rPr lang="en-US" dirty="0" err="1" smtClean="0"/>
+              <a:t>domande</a:t>
+            </a:r>
+            <a:endParaRPr lang="en-US" dirty="0" smtClean="0"/>
+          </a:p>
+          <a:p>
+            <a:pPr lvl="2">
+              <a:buFont typeface="Arial" pitchFamily="34" charset="0"/>
+              <a:buChar char="•"/>
+            </a:pPr>
+            <a:r>
+              <a:rPr lang="en-US" dirty="0" err="1" smtClean="0"/>
+              <a:t>Gestire</a:t>
+            </a:r>
+            <a:r>
+              <a:rPr lang="en-US" dirty="0" smtClean="0"/>
+              <a:t> </a:t>
+            </a:r>
+            <a:r>
+              <a:rPr lang="en-US" dirty="0" err="1" smtClean="0"/>
+              <a:t>tramite</a:t>
+            </a:r>
+            <a:r>
+              <a:rPr lang="en-US" dirty="0" smtClean="0"/>
+              <a:t> prolog le </a:t>
+            </a:r>
+            <a:r>
+              <a:rPr lang="en-US" dirty="0" err="1" smtClean="0"/>
+              <a:t>sessioni</a:t>
+            </a:r>
+            <a:r>
+              <a:rPr lang="en-US" dirty="0" smtClean="0"/>
+              <a:t> </a:t>
+            </a:r>
+            <a:r>
+              <a:rPr lang="en-US" dirty="0" err="1" smtClean="0"/>
+              <a:t>di</a:t>
+            </a:r>
+            <a:r>
+              <a:rPr lang="en-US" dirty="0" smtClean="0"/>
+              <a:t> </a:t>
+            </a:r>
+            <a:r>
+              <a:rPr lang="en-US" dirty="0" err="1" smtClean="0"/>
+              <a:t>più</a:t>
+            </a:r>
+            <a:r>
+              <a:rPr lang="en-US" dirty="0" smtClean="0"/>
+              <a:t> </a:t>
+            </a:r>
+            <a:r>
+              <a:rPr lang="en-US" dirty="0" err="1" smtClean="0"/>
+              <a:t>utenti</a:t>
+            </a:r>
+            <a:endParaRPr lang="en-US" dirty="0" smtClean="0"/>
           </a:p>
           <a:p>
             <a:pPr lvl="1">
@@ -3282,8 +3384,236 @@
               <a:buChar char="•"/>
             </a:pPr>
             <a:r>
+              <a:rPr lang="en-US" dirty="0" smtClean="0"/>
+              <a:t>Sprint3</a:t>
+            </a:r>
+          </a:p>
+          <a:p>
+            <a:pPr lvl="2">
+              <a:buFont typeface="Arial" pitchFamily="34" charset="0"/>
+              <a:buChar char="•"/>
+            </a:pPr>
+            <a:r>
+              <a:rPr lang="en-US" dirty="0" smtClean="0"/>
+              <a:t>Dare la </a:t>
+            </a:r>
+            <a:r>
+              <a:rPr lang="en-US" dirty="0" err="1" smtClean="0"/>
+              <a:t>possibilità</a:t>
+            </a:r>
+            <a:r>
+              <a:rPr lang="en-US" dirty="0" smtClean="0"/>
+              <a:t> </a:t>
+            </a:r>
+            <a:r>
+              <a:rPr lang="en-US" dirty="0" err="1" smtClean="0"/>
+              <a:t>di</a:t>
+            </a:r>
+            <a:r>
+              <a:rPr lang="en-US" dirty="0" smtClean="0"/>
+              <a:t> </a:t>
+            </a:r>
+            <a:r>
+              <a:rPr lang="en-US" dirty="0" err="1" smtClean="0"/>
+              <a:t>generare</a:t>
+            </a:r>
+            <a:r>
+              <a:rPr lang="en-US" dirty="0" smtClean="0"/>
+              <a:t> </a:t>
+            </a:r>
+            <a:r>
+              <a:rPr lang="en-US" dirty="0" err="1" smtClean="0"/>
+              <a:t>il</a:t>
+            </a:r>
+            <a:r>
+              <a:rPr lang="en-US" dirty="0" smtClean="0"/>
+              <a:t> </a:t>
+            </a:r>
+            <a:r>
+              <a:rPr lang="en-US" dirty="0" err="1" smtClean="0"/>
+              <a:t>proprio</a:t>
+            </a:r>
+            <a:r>
+              <a:rPr lang="en-US" dirty="0" smtClean="0"/>
+              <a:t> survey</a:t>
+            </a:r>
+            <a:endParaRPr lang="en-US" dirty="0" smtClean="0"/>
+          </a:p>
+          <a:p>
+            <a:pPr lvl="2">
+              <a:buFont typeface="Arial" pitchFamily="34" charset="0"/>
+              <a:buChar char="•"/>
+            </a:pPr>
+            <a:r>
+              <a:rPr lang="en-US" dirty="0" err="1" smtClean="0"/>
+              <a:t>Disegnare</a:t>
+            </a:r>
+            <a:r>
+              <a:rPr lang="en-US" dirty="0" smtClean="0"/>
+              <a:t> </a:t>
+            </a:r>
+            <a:r>
+              <a:rPr lang="en-US" dirty="0" err="1" smtClean="0"/>
+              <a:t>l’albero</a:t>
+            </a:r>
+            <a:r>
+              <a:rPr lang="en-US" dirty="0" smtClean="0"/>
+              <a:t> </a:t>
+            </a:r>
+            <a:r>
+              <a:rPr lang="en-US" dirty="0" err="1" smtClean="0"/>
+              <a:t>delle</a:t>
+            </a:r>
+            <a:r>
+              <a:rPr lang="en-US" dirty="0" smtClean="0"/>
+              <a:t> </a:t>
+            </a:r>
+            <a:r>
+              <a:rPr lang="en-US" dirty="0" err="1" smtClean="0"/>
+              <a:t>domande</a:t>
+            </a:r>
+            <a:r>
+              <a:rPr lang="en-US" dirty="0" smtClean="0"/>
+              <a:t> </a:t>
+            </a:r>
+            <a:r>
+              <a:rPr lang="en-US" dirty="0" err="1" smtClean="0"/>
+              <a:t>di</a:t>
+            </a:r>
+            <a:r>
+              <a:rPr lang="en-US" dirty="0" smtClean="0"/>
+              <a:t> un </a:t>
+            </a:r>
+            <a:r>
+              <a:rPr lang="en-US" dirty="0" smtClean="0"/>
+              <a:t>survey</a:t>
+            </a:r>
+            <a:endParaRPr lang="it-IT" dirty="0" smtClean="0"/>
+          </a:p>
+          <a:p>
+            <a:pPr lvl="1">
+              <a:buFont typeface="Arial" pitchFamily="34" charset="0"/>
+              <a:buChar char="•"/>
+            </a:pPr>
+            <a:r>
               <a:rPr lang="it-IT" dirty="0" smtClean="0"/>
-              <a:t>Sprint3</a:t>
+              <a:t>Sprint4</a:t>
+            </a:r>
+            <a:endParaRPr lang="it-IT" dirty="0" smtClean="0"/>
+          </a:p>
+          <a:p>
+            <a:pPr lvl="2">
+              <a:buFont typeface="Arial" pitchFamily="34" charset="0"/>
+              <a:buChar char="•"/>
+            </a:pPr>
+            <a:r>
+              <a:rPr lang="it-IT" dirty="0" smtClean="0"/>
+              <a:t>Implementare un modulo per la comunicazione ad un </a:t>
+            </a:r>
+            <a:r>
+              <a:rPr lang="it-IT" dirty="0" err="1" smtClean="0"/>
+              <a:t>MongoDB</a:t>
+            </a:r>
+            <a:r>
+              <a:rPr lang="it-IT" dirty="0" smtClean="0"/>
+              <a:t> tramite </a:t>
+            </a:r>
+            <a:r>
+              <a:rPr lang="it-IT" dirty="0" err="1" smtClean="0"/>
+              <a:t>Prolog</a:t>
+            </a:r>
+            <a:endParaRPr lang="it-IT" dirty="0" smtClean="0"/>
+          </a:p>
+          <a:p>
+            <a:pPr lvl="1">
+              <a:buFont typeface="Arial" pitchFamily="34" charset="0"/>
+              <a:buChar char="•"/>
+            </a:pPr>
+            <a:r>
+              <a:rPr lang="it-IT" dirty="0" smtClean="0"/>
+              <a:t>Sprint5</a:t>
+            </a:r>
+            <a:endParaRPr lang="it-IT" dirty="0"/>
+          </a:p>
+        </p:txBody>
+      </p:sp>
+    </p:spTree>
+  </p:cSld>
+  <p:clrMapOvr>
+    <a:masterClrMapping/>
+  </p:clrMapOvr>
+</p:sld>
+</file>
+
+<file path=ppt/slides/slide2.xml><?xml version="1.0" encoding="utf-8"?>
+<p:sld xmlns:a="http://schemas.openxmlformats.org/drawingml/2006/main" xmlns:r="http://schemas.openxmlformats.org/officeDocument/2006/relationships" xmlns:p="http://schemas.openxmlformats.org/presentationml/2006/main">
+  <p:cSld>
+    <p:spTree>
+      <p:nvGrpSpPr>
+        <p:cNvPr id="1" name=""/>
+        <p:cNvGrpSpPr/>
+        <p:nvPr/>
+      </p:nvGrpSpPr>
+      <p:grpSpPr>
+        <a:xfrm>
+          <a:off x="0" y="0"/>
+          <a:ext cx="0" cy="0"/>
+          <a:chOff x="0" y="0"/>
+          <a:chExt cx="0" cy="0"/>
+        </a:xfrm>
+      </p:grpSpPr>
+      <p:sp>
+        <p:nvSpPr>
+          <p:cNvPr id="2" name="Title 1"/>
+          <p:cNvSpPr>
+            <a:spLocks noGrp="1"/>
+          </p:cNvSpPr>
+          <p:nvPr>
+            <p:ph type="title"/>
+          </p:nvPr>
+        </p:nvSpPr>
+        <p:spPr/>
+        <p:txBody>
+          <a:bodyPr/>
+          <a:lstStyle/>
+          <a:p>
+            <a:r>
+              <a:rPr lang="it-IT" dirty="0" smtClean="0"/>
+              <a:t>Thx to</a:t>
+            </a:r>
+            <a:endParaRPr lang="it-IT" dirty="0"/>
+          </a:p>
+        </p:txBody>
+      </p:sp>
+      <p:sp>
+        <p:nvSpPr>
+          <p:cNvPr id="3" name="Content Placeholder 2"/>
+          <p:cNvSpPr>
+            <a:spLocks noGrp="1"/>
+          </p:cNvSpPr>
+          <p:nvPr>
+            <p:ph idx="1"/>
+          </p:nvPr>
+        </p:nvSpPr>
+        <p:spPr/>
+        <p:txBody>
+          <a:bodyPr/>
+          <a:lstStyle/>
+          <a:p>
+            <a:r>
+              <a:rPr lang="it-IT" dirty="0" smtClean="0"/>
+              <a:t>https://github.com/rla/node-swipl.git</a:t>
+            </a:r>
+            <a:endParaRPr lang="it-IT" dirty="0" smtClean="0"/>
+          </a:p>
+          <a:p>
+            <a:r>
+              <a:rPr lang="it-IT" dirty="0" smtClean="0"/>
+              <a:t>https</a:t>
+            </a:r>
+            <a:r>
+              <a:rPr lang="it-IT" dirty="0" smtClean="0"/>
+              <a:t>://github.com/jacomyal/sigma.js.git</a:t>
             </a:r>
             <a:endParaRPr lang="it-IT" dirty="0"/>
           </a:p>

</xml_diff>